<commit_message>
initial data validation setup; began validation schema
</commit_message>
<xml_diff>
--- a/Maximizing Profit for Lending Club.pptx
+++ b/Maximizing Profit for Lending Club.pptx
@@ -5,7 +5,7 @@
     <p:sldMasterId id="2147483648" r:id="rId1"/>
   </p:sldMasterIdLst>
   <p:notesMasterIdLst>
-    <p:notesMasterId r:id="rId17"/>
+    <p:notesMasterId r:id="rId18"/>
   </p:notesMasterIdLst>
   <p:sldIdLst>
     <p:sldId id="256" r:id="rId2"/>
@@ -13,16 +13,17 @@
     <p:sldId id="257" r:id="rId4"/>
     <p:sldId id="259" r:id="rId5"/>
     <p:sldId id="263" r:id="rId6"/>
-    <p:sldId id="264" r:id="rId7"/>
-    <p:sldId id="266" r:id="rId8"/>
-    <p:sldId id="265" r:id="rId9"/>
-    <p:sldId id="267" r:id="rId10"/>
-    <p:sldId id="268" r:id="rId11"/>
-    <p:sldId id="269" r:id="rId12"/>
-    <p:sldId id="270" r:id="rId13"/>
-    <p:sldId id="261" r:id="rId14"/>
-    <p:sldId id="258" r:id="rId15"/>
-    <p:sldId id="271" r:id="rId16"/>
+    <p:sldId id="272" r:id="rId7"/>
+    <p:sldId id="264" r:id="rId8"/>
+    <p:sldId id="266" r:id="rId9"/>
+    <p:sldId id="265" r:id="rId10"/>
+    <p:sldId id="267" r:id="rId11"/>
+    <p:sldId id="268" r:id="rId12"/>
+    <p:sldId id="269" r:id="rId13"/>
+    <p:sldId id="270" r:id="rId14"/>
+    <p:sldId id="261" r:id="rId15"/>
+    <p:sldId id="258" r:id="rId16"/>
+    <p:sldId id="271" r:id="rId17"/>
   </p:sldIdLst>
   <p:sldSz cx="12192000" cy="6858000"/>
   <p:notesSz cx="6858000" cy="9144000"/>
@@ -576,6 +577,114 @@
         <p:cNvPr id="1" name="">
           <a:extLst>
             <a:ext uri="{FF2B5EF4-FFF2-40B4-BE49-F238E27FC236}">
+              <a16:creationId xmlns:a16="http://schemas.microsoft.com/office/drawing/2014/main" id="{1E28FE46-328F-2147-E19D-7CC922B15D0C}"/>
+            </a:ext>
+          </a:extLst>
+        </p:cNvPr>
+        <p:cNvGrpSpPr/>
+        <p:nvPr/>
+      </p:nvGrpSpPr>
+      <p:grpSpPr>
+        <a:xfrm>
+          <a:off x="0" y="0"/>
+          <a:ext cx="0" cy="0"/>
+          <a:chOff x="0" y="0"/>
+          <a:chExt cx="0" cy="0"/>
+        </a:xfrm>
+      </p:grpSpPr>
+      <p:sp>
+        <p:nvSpPr>
+          <p:cNvPr id="2" name="Slide Image Placeholder 1">
+            <a:extLst>
+              <a:ext uri="{FF2B5EF4-FFF2-40B4-BE49-F238E27FC236}">
+                <a16:creationId xmlns:a16="http://schemas.microsoft.com/office/drawing/2014/main" id="{F3950A8C-3D6D-ADF2-5450-3B546C5172D9}"/>
+              </a:ext>
+            </a:extLst>
+          </p:cNvPr>
+          <p:cNvSpPr>
+            <a:spLocks noGrp="1" noRot="1" noChangeAspect="1"/>
+          </p:cNvSpPr>
+          <p:nvPr>
+            <p:ph type="sldImg"/>
+          </p:nvPr>
+        </p:nvSpPr>
+        <p:spPr/>
+      </p:sp>
+      <p:sp>
+        <p:nvSpPr>
+          <p:cNvPr id="3" name="Notes Placeholder 2">
+            <a:extLst>
+              <a:ext uri="{FF2B5EF4-FFF2-40B4-BE49-F238E27FC236}">
+                <a16:creationId xmlns:a16="http://schemas.microsoft.com/office/drawing/2014/main" id="{F16661BD-3180-F7A4-BB54-7D77C09C991A}"/>
+              </a:ext>
+            </a:extLst>
+          </p:cNvPr>
+          <p:cNvSpPr>
+            <a:spLocks noGrp="1"/>
+          </p:cNvSpPr>
+          <p:nvPr>
+            <p:ph type="body" idx="1"/>
+          </p:nvPr>
+        </p:nvSpPr>
+        <p:spPr/>
+        <p:txBody>
+          <a:bodyPr/>
+          <a:lstStyle/>
+          <a:p>
+            <a:endParaRPr lang="en-US" dirty="0"/>
+          </a:p>
+        </p:txBody>
+      </p:sp>
+      <p:sp>
+        <p:nvSpPr>
+          <p:cNvPr id="4" name="Slide Number Placeholder 3">
+            <a:extLst>
+              <a:ext uri="{FF2B5EF4-FFF2-40B4-BE49-F238E27FC236}">
+                <a16:creationId xmlns:a16="http://schemas.microsoft.com/office/drawing/2014/main" id="{017C080D-B326-7508-5260-9D0CD8BDFFAE}"/>
+              </a:ext>
+            </a:extLst>
+          </p:cNvPr>
+          <p:cNvSpPr>
+            <a:spLocks noGrp="1"/>
+          </p:cNvSpPr>
+          <p:nvPr>
+            <p:ph type="sldNum" sz="quarter" idx="5"/>
+          </p:nvPr>
+        </p:nvSpPr>
+        <p:spPr/>
+        <p:txBody>
+          <a:bodyPr/>
+          <a:lstStyle/>
+          <a:p>
+            <a:fld id="{139A45AF-05CC-EE4A-A237-5C8AF9F12E6C}" type="slidenum">
+              <a:rPr lang="en-US" smtClean="0"/>
+              <a:t>13</a:t>
+            </a:fld>
+            <a:endParaRPr lang="en-US"/>
+          </a:p>
+        </p:txBody>
+      </p:sp>
+    </p:spTree>
+    <p:extLst>
+      <p:ext uri="{BB962C8B-B14F-4D97-AF65-F5344CB8AC3E}">
+        <p14:creationId xmlns:p14="http://schemas.microsoft.com/office/powerpoint/2010/main" val="1361589240"/>
+      </p:ext>
+    </p:extLst>
+  </p:cSld>
+  <p:clrMapOvr>
+    <a:masterClrMapping/>
+  </p:clrMapOvr>
+</p:notes>
+</file>
+
+<file path=ppt/notesSlides/notesSlide11.xml><?xml version="1.0" encoding="utf-8"?>
+<p:notes xmlns:a="http://schemas.openxmlformats.org/drawingml/2006/main" xmlns:r="http://schemas.openxmlformats.org/officeDocument/2006/relationships" xmlns:p="http://schemas.openxmlformats.org/presentationml/2006/main">
+  <p:cSld>
+    <p:spTree>
+      <p:nvGrpSpPr>
+        <p:cNvPr id="1" name="">
+          <a:extLst>
+            <a:ext uri="{FF2B5EF4-FFF2-40B4-BE49-F238E27FC236}">
               <a16:creationId xmlns:a16="http://schemas.microsoft.com/office/drawing/2014/main" id="{0901DAB8-409A-8B6B-220B-125134DB79C5}"/>
             </a:ext>
           </a:extLst>
@@ -657,7 +766,7 @@
           <a:p>
             <a:fld id="{139A45AF-05CC-EE4A-A237-5C8AF9F12E6C}" type="slidenum">
               <a:rPr lang="en-US" smtClean="0"/>
-              <a:t>13</a:t>
+              <a:t>14</a:t>
             </a:fld>
             <a:endParaRPr lang="en-US"/>
           </a:p>
@@ -676,7 +785,7 @@
 </p:notes>
 </file>
 
-<file path=ppt/notesSlides/notesSlide11.xml><?xml version="1.0" encoding="utf-8"?>
+<file path=ppt/notesSlides/notesSlide12.xml><?xml version="1.0" encoding="utf-8"?>
 <p:notes xmlns:a="http://schemas.openxmlformats.org/drawingml/2006/main" xmlns:r="http://schemas.openxmlformats.org/officeDocument/2006/relationships" xmlns:p="http://schemas.openxmlformats.org/presentationml/2006/main">
   <p:cSld>
     <p:spTree>
@@ -771,7 +880,7 @@
           <a:p>
             <a:fld id="{139A45AF-05CC-EE4A-A237-5C8AF9F12E6C}" type="slidenum">
               <a:rPr lang="en-US" smtClean="0"/>
-              <a:t>15</a:t>
+              <a:t>16</a:t>
             </a:fld>
             <a:endParaRPr lang="en-US"/>
           </a:p>
@@ -912,6 +1021,120 @@
         <p:cNvPr id="1" name="">
           <a:extLst>
             <a:ext uri="{FF2B5EF4-FFF2-40B4-BE49-F238E27FC236}">
+              <a16:creationId xmlns:a16="http://schemas.microsoft.com/office/drawing/2014/main" id="{CA128419-549F-7A7D-C689-630FC6B9297B}"/>
+            </a:ext>
+          </a:extLst>
+        </p:cNvPr>
+        <p:cNvGrpSpPr/>
+        <p:nvPr/>
+      </p:nvGrpSpPr>
+      <p:grpSpPr>
+        <a:xfrm>
+          <a:off x="0" y="0"/>
+          <a:ext cx="0" cy="0"/>
+          <a:chOff x="0" y="0"/>
+          <a:chExt cx="0" cy="0"/>
+        </a:xfrm>
+      </p:grpSpPr>
+      <p:sp>
+        <p:nvSpPr>
+          <p:cNvPr id="2" name="Slide Image Placeholder 1">
+            <a:extLst>
+              <a:ext uri="{FF2B5EF4-FFF2-40B4-BE49-F238E27FC236}">
+                <a16:creationId xmlns:a16="http://schemas.microsoft.com/office/drawing/2014/main" id="{20DE8028-58D9-A7AA-1932-41722E0AEBA0}"/>
+              </a:ext>
+            </a:extLst>
+          </p:cNvPr>
+          <p:cNvSpPr>
+            <a:spLocks noGrp="1" noRot="1" noChangeAspect="1"/>
+          </p:cNvSpPr>
+          <p:nvPr>
+            <p:ph type="sldImg"/>
+          </p:nvPr>
+        </p:nvSpPr>
+        <p:spPr/>
+      </p:sp>
+      <p:sp>
+        <p:nvSpPr>
+          <p:cNvPr id="3" name="Notes Placeholder 2">
+            <a:extLst>
+              <a:ext uri="{FF2B5EF4-FFF2-40B4-BE49-F238E27FC236}">
+                <a16:creationId xmlns:a16="http://schemas.microsoft.com/office/drawing/2014/main" id="{1E516CBC-7656-B782-5A51-D6FC96BC83B7}"/>
+              </a:ext>
+            </a:extLst>
+          </p:cNvPr>
+          <p:cNvSpPr>
+            <a:spLocks noGrp="1"/>
+          </p:cNvSpPr>
+          <p:nvPr>
+            <p:ph type="body" idx="1"/>
+          </p:nvPr>
+        </p:nvSpPr>
+        <p:spPr/>
+        <p:txBody>
+          <a:bodyPr/>
+          <a:lstStyle/>
+          <a:p>
+            <a:endParaRPr lang="en-US" dirty="0"/>
+          </a:p>
+          <a:p>
+            <a:r>
+              <a:rPr lang="en-US" dirty="0"/>
+              <a:t>Describe the dataset</a:t>
+            </a:r>
+          </a:p>
+        </p:txBody>
+      </p:sp>
+      <p:sp>
+        <p:nvSpPr>
+          <p:cNvPr id="4" name="Slide Number Placeholder 3">
+            <a:extLst>
+              <a:ext uri="{FF2B5EF4-FFF2-40B4-BE49-F238E27FC236}">
+                <a16:creationId xmlns:a16="http://schemas.microsoft.com/office/drawing/2014/main" id="{F44D6686-1CB8-2419-0D0D-B50F0F437F0D}"/>
+              </a:ext>
+            </a:extLst>
+          </p:cNvPr>
+          <p:cNvSpPr>
+            <a:spLocks noGrp="1"/>
+          </p:cNvSpPr>
+          <p:nvPr>
+            <p:ph type="sldNum" sz="quarter" idx="5"/>
+          </p:nvPr>
+        </p:nvSpPr>
+        <p:spPr/>
+        <p:txBody>
+          <a:bodyPr/>
+          <a:lstStyle/>
+          <a:p>
+            <a:fld id="{139A45AF-05CC-EE4A-A237-5C8AF9F12E6C}" type="slidenum">
+              <a:rPr lang="en-US" smtClean="0"/>
+              <a:t>6</a:t>
+            </a:fld>
+            <a:endParaRPr lang="en-US"/>
+          </a:p>
+        </p:txBody>
+      </p:sp>
+    </p:spTree>
+    <p:extLst>
+      <p:ext uri="{BB962C8B-B14F-4D97-AF65-F5344CB8AC3E}">
+        <p14:creationId xmlns:p14="http://schemas.microsoft.com/office/powerpoint/2010/main" val="228166721"/>
+      </p:ext>
+    </p:extLst>
+  </p:cSld>
+  <p:clrMapOvr>
+    <a:masterClrMapping/>
+  </p:clrMapOvr>
+</p:notes>
+</file>
+
+<file path=ppt/notesSlides/notesSlide4.xml><?xml version="1.0" encoding="utf-8"?>
+<p:notes xmlns:a="http://schemas.openxmlformats.org/drawingml/2006/main" xmlns:r="http://schemas.openxmlformats.org/officeDocument/2006/relationships" xmlns:p="http://schemas.openxmlformats.org/presentationml/2006/main">
+  <p:cSld>
+    <p:spTree>
+      <p:nvGrpSpPr>
+        <p:cNvPr id="1" name="">
+          <a:extLst>
+            <a:ext uri="{FF2B5EF4-FFF2-40B4-BE49-F238E27FC236}">
               <a16:creationId xmlns:a16="http://schemas.microsoft.com/office/drawing/2014/main" id="{B74393A9-55DE-7E74-923D-3E6D2A790293}"/>
             </a:ext>
           </a:extLst>
@@ -993,7 +1216,7 @@
           <a:p>
             <a:fld id="{139A45AF-05CC-EE4A-A237-5C8AF9F12E6C}" type="slidenum">
               <a:rPr lang="en-US" smtClean="0"/>
-              <a:t>6</a:t>
+              <a:t>7</a:t>
             </a:fld>
             <a:endParaRPr lang="en-US"/>
           </a:p>
@@ -1012,7 +1235,7 @@
 </p:notes>
 </file>
 
-<file path=ppt/notesSlides/notesSlide4.xml><?xml version="1.0" encoding="utf-8"?>
+<file path=ppt/notesSlides/notesSlide5.xml><?xml version="1.0" encoding="utf-8"?>
 <p:notes xmlns:a="http://schemas.openxmlformats.org/drawingml/2006/main" xmlns:r="http://schemas.openxmlformats.org/officeDocument/2006/relationships" xmlns:p="http://schemas.openxmlformats.org/presentationml/2006/main">
   <p:cSld>
     <p:spTree>
@@ -1101,7 +1324,7 @@
           <a:p>
             <a:fld id="{139A45AF-05CC-EE4A-A237-5C8AF9F12E6C}" type="slidenum">
               <a:rPr lang="en-US" smtClean="0"/>
-              <a:t>7</a:t>
+              <a:t>8</a:t>
             </a:fld>
             <a:endParaRPr lang="en-US"/>
           </a:p>
@@ -1120,7 +1343,7 @@
 </p:notes>
 </file>
 
-<file path=ppt/notesSlides/notesSlide5.xml><?xml version="1.0" encoding="utf-8"?>
+<file path=ppt/notesSlides/notesSlide6.xml><?xml version="1.0" encoding="utf-8"?>
 <p:notes xmlns:a="http://schemas.openxmlformats.org/drawingml/2006/main" xmlns:r="http://schemas.openxmlformats.org/officeDocument/2006/relationships" xmlns:p="http://schemas.openxmlformats.org/presentationml/2006/main">
   <p:cSld>
     <p:spTree>
@@ -1209,7 +1432,7 @@
           <a:p>
             <a:fld id="{139A45AF-05CC-EE4A-A237-5C8AF9F12E6C}" type="slidenum">
               <a:rPr lang="en-US" smtClean="0"/>
-              <a:t>8</a:t>
+              <a:t>9</a:t>
             </a:fld>
             <a:endParaRPr lang="en-US"/>
           </a:p>
@@ -1228,7 +1451,7 @@
 </p:notes>
 </file>
 
-<file path=ppt/notesSlides/notesSlide6.xml><?xml version="1.0" encoding="utf-8"?>
+<file path=ppt/notesSlides/notesSlide7.xml><?xml version="1.0" encoding="utf-8"?>
 <p:notes xmlns:a="http://schemas.openxmlformats.org/drawingml/2006/main" xmlns:r="http://schemas.openxmlformats.org/officeDocument/2006/relationships" xmlns:p="http://schemas.openxmlformats.org/presentationml/2006/main">
   <p:cSld>
     <p:spTree>
@@ -1317,7 +1540,7 @@
           <a:p>
             <a:fld id="{139A45AF-05CC-EE4A-A237-5C8AF9F12E6C}" type="slidenum">
               <a:rPr lang="en-US" smtClean="0"/>
-              <a:t>9</a:t>
+              <a:t>10</a:t>
             </a:fld>
             <a:endParaRPr lang="en-US"/>
           </a:p>
@@ -1336,7 +1559,7 @@
 </p:notes>
 </file>
 
-<file path=ppt/notesSlides/notesSlide7.xml><?xml version="1.0" encoding="utf-8"?>
+<file path=ppt/notesSlides/notesSlide8.xml><?xml version="1.0" encoding="utf-8"?>
 <p:notes xmlns:a="http://schemas.openxmlformats.org/drawingml/2006/main" xmlns:r="http://schemas.openxmlformats.org/officeDocument/2006/relationships" xmlns:p="http://schemas.openxmlformats.org/presentationml/2006/main">
   <p:cSld>
     <p:spTree>
@@ -1425,7 +1648,7 @@
           <a:p>
             <a:fld id="{139A45AF-05CC-EE4A-A237-5C8AF9F12E6C}" type="slidenum">
               <a:rPr lang="en-US" smtClean="0"/>
-              <a:t>10</a:t>
+              <a:t>11</a:t>
             </a:fld>
             <a:endParaRPr lang="en-US"/>
           </a:p>
@@ -1444,7 +1667,7 @@
 </p:notes>
 </file>
 
-<file path=ppt/notesSlides/notesSlide8.xml><?xml version="1.0" encoding="utf-8"?>
+<file path=ppt/notesSlides/notesSlide9.xml><?xml version="1.0" encoding="utf-8"?>
 <p:notes xmlns:a="http://schemas.openxmlformats.org/drawingml/2006/main" xmlns:r="http://schemas.openxmlformats.org/officeDocument/2006/relationships" xmlns:p="http://schemas.openxmlformats.org/presentationml/2006/main">
   <p:cSld>
     <p:spTree>
@@ -1533,7 +1756,7 @@
           <a:p>
             <a:fld id="{139A45AF-05CC-EE4A-A237-5C8AF9F12E6C}" type="slidenum">
               <a:rPr lang="en-US" smtClean="0"/>
-              <a:t>11</a:t>
+              <a:t>12</a:t>
             </a:fld>
             <a:endParaRPr lang="en-US"/>
           </a:p>
@@ -1543,114 +1766,6 @@
     <p:extLst>
       <p:ext uri="{BB962C8B-B14F-4D97-AF65-F5344CB8AC3E}">
         <p14:creationId xmlns:p14="http://schemas.microsoft.com/office/powerpoint/2010/main" val="280426245"/>
-      </p:ext>
-    </p:extLst>
-  </p:cSld>
-  <p:clrMapOvr>
-    <a:masterClrMapping/>
-  </p:clrMapOvr>
-</p:notes>
-</file>
-
-<file path=ppt/notesSlides/notesSlide9.xml><?xml version="1.0" encoding="utf-8"?>
-<p:notes xmlns:a="http://schemas.openxmlformats.org/drawingml/2006/main" xmlns:r="http://schemas.openxmlformats.org/officeDocument/2006/relationships" xmlns:p="http://schemas.openxmlformats.org/presentationml/2006/main">
-  <p:cSld>
-    <p:spTree>
-      <p:nvGrpSpPr>
-        <p:cNvPr id="1" name="">
-          <a:extLst>
-            <a:ext uri="{FF2B5EF4-FFF2-40B4-BE49-F238E27FC236}">
-              <a16:creationId xmlns:a16="http://schemas.microsoft.com/office/drawing/2014/main" id="{1E28FE46-328F-2147-E19D-7CC922B15D0C}"/>
-            </a:ext>
-          </a:extLst>
-        </p:cNvPr>
-        <p:cNvGrpSpPr/>
-        <p:nvPr/>
-      </p:nvGrpSpPr>
-      <p:grpSpPr>
-        <a:xfrm>
-          <a:off x="0" y="0"/>
-          <a:ext cx="0" cy="0"/>
-          <a:chOff x="0" y="0"/>
-          <a:chExt cx="0" cy="0"/>
-        </a:xfrm>
-      </p:grpSpPr>
-      <p:sp>
-        <p:nvSpPr>
-          <p:cNvPr id="2" name="Slide Image Placeholder 1">
-            <a:extLst>
-              <a:ext uri="{FF2B5EF4-FFF2-40B4-BE49-F238E27FC236}">
-                <a16:creationId xmlns:a16="http://schemas.microsoft.com/office/drawing/2014/main" id="{F3950A8C-3D6D-ADF2-5450-3B546C5172D9}"/>
-              </a:ext>
-            </a:extLst>
-          </p:cNvPr>
-          <p:cNvSpPr>
-            <a:spLocks noGrp="1" noRot="1" noChangeAspect="1"/>
-          </p:cNvSpPr>
-          <p:nvPr>
-            <p:ph type="sldImg"/>
-          </p:nvPr>
-        </p:nvSpPr>
-        <p:spPr/>
-      </p:sp>
-      <p:sp>
-        <p:nvSpPr>
-          <p:cNvPr id="3" name="Notes Placeholder 2">
-            <a:extLst>
-              <a:ext uri="{FF2B5EF4-FFF2-40B4-BE49-F238E27FC236}">
-                <a16:creationId xmlns:a16="http://schemas.microsoft.com/office/drawing/2014/main" id="{F16661BD-3180-F7A4-BB54-7D77C09C991A}"/>
-              </a:ext>
-            </a:extLst>
-          </p:cNvPr>
-          <p:cNvSpPr>
-            <a:spLocks noGrp="1"/>
-          </p:cNvSpPr>
-          <p:nvPr>
-            <p:ph type="body" idx="1"/>
-          </p:nvPr>
-        </p:nvSpPr>
-        <p:spPr/>
-        <p:txBody>
-          <a:bodyPr/>
-          <a:lstStyle/>
-          <a:p>
-            <a:endParaRPr lang="en-US" dirty="0"/>
-          </a:p>
-        </p:txBody>
-      </p:sp>
-      <p:sp>
-        <p:nvSpPr>
-          <p:cNvPr id="4" name="Slide Number Placeholder 3">
-            <a:extLst>
-              <a:ext uri="{FF2B5EF4-FFF2-40B4-BE49-F238E27FC236}">
-                <a16:creationId xmlns:a16="http://schemas.microsoft.com/office/drawing/2014/main" id="{017C080D-B326-7508-5260-9D0CD8BDFFAE}"/>
-              </a:ext>
-            </a:extLst>
-          </p:cNvPr>
-          <p:cNvSpPr>
-            <a:spLocks noGrp="1"/>
-          </p:cNvSpPr>
-          <p:nvPr>
-            <p:ph type="sldNum" sz="quarter" idx="5"/>
-          </p:nvPr>
-        </p:nvSpPr>
-        <p:spPr/>
-        <p:txBody>
-          <a:bodyPr/>
-          <a:lstStyle/>
-          <a:p>
-            <a:fld id="{139A45AF-05CC-EE4A-A237-5C8AF9F12E6C}" type="slidenum">
-              <a:rPr lang="en-US" smtClean="0"/>
-              <a:t>12</a:t>
-            </a:fld>
-            <a:endParaRPr lang="en-US"/>
-          </a:p>
-        </p:txBody>
-      </p:sp>
-    </p:spTree>
-    <p:extLst>
-      <p:ext uri="{BB962C8B-B14F-4D97-AF65-F5344CB8AC3E}">
-        <p14:creationId xmlns:p14="http://schemas.microsoft.com/office/powerpoint/2010/main" val="1361589240"/>
       </p:ext>
     </p:extLst>
   </p:cSld>
@@ -5034,6 +5149,391 @@
         <p:cNvPr id="1" name="">
           <a:extLst>
             <a:ext uri="{FF2B5EF4-FFF2-40B4-BE49-F238E27FC236}">
+              <a16:creationId xmlns:a16="http://schemas.microsoft.com/office/drawing/2014/main" id="{6D488F88-CFE0-0044-2478-878EBB98BE79}"/>
+            </a:ext>
+          </a:extLst>
+        </p:cNvPr>
+        <p:cNvGrpSpPr/>
+        <p:nvPr/>
+      </p:nvGrpSpPr>
+      <p:grpSpPr>
+        <a:xfrm>
+          <a:off x="0" y="0"/>
+          <a:ext cx="0" cy="0"/>
+          <a:chOff x="0" y="0"/>
+          <a:chExt cx="0" cy="0"/>
+        </a:xfrm>
+      </p:grpSpPr>
+      <p:grpSp>
+        <p:nvGrpSpPr>
+          <p:cNvPr id="20" name="Group 19">
+            <a:extLst>
+              <a:ext uri="{FF2B5EF4-FFF2-40B4-BE49-F238E27FC236}">
+                <a16:creationId xmlns:a16="http://schemas.microsoft.com/office/drawing/2014/main" id="{97052BDD-91EA-6972-4BD8-744EF8494C7F}"/>
+              </a:ext>
+            </a:extLst>
+          </p:cNvPr>
+          <p:cNvGrpSpPr/>
+          <p:nvPr/>
+        </p:nvGrpSpPr>
+        <p:grpSpPr>
+          <a:xfrm>
+            <a:off x="0" y="0"/>
+            <a:ext cx="12192000" cy="6858000"/>
+            <a:chOff x="0" y="0"/>
+            <a:chExt cx="12192000" cy="6858000"/>
+          </a:xfrm>
+        </p:grpSpPr>
+        <p:sp>
+          <p:nvSpPr>
+            <p:cNvPr id="9" name="TextBox 8">
+              <a:extLst>
+                <a:ext uri="{FF2B5EF4-FFF2-40B4-BE49-F238E27FC236}">
+                  <a16:creationId xmlns:a16="http://schemas.microsoft.com/office/drawing/2014/main" id="{9EE4729A-4522-4DB7-C39B-31D58F716EB9}"/>
+                </a:ext>
+              </a:extLst>
+            </p:cNvPr>
+            <p:cNvSpPr txBox="1"/>
+            <p:nvPr/>
+          </p:nvSpPr>
+          <p:spPr>
+            <a:xfrm>
+              <a:off x="325120" y="0"/>
+              <a:ext cx="11866880" cy="584775"/>
+            </a:xfrm>
+            <a:prstGeom prst="rect">
+              <a:avLst/>
+            </a:prstGeom>
+            <a:noFill/>
+          </p:spPr>
+          <p:txBody>
+            <a:bodyPr wrap="square" rtlCol="0">
+              <a:spAutoFit/>
+            </a:bodyPr>
+            <a:lstStyle/>
+            <a:p>
+              <a:r>
+                <a:rPr lang="en-US" sz="3200" b="1" dirty="0">
+                  <a:solidFill>
+                    <a:schemeClr val="accent1">
+                      <a:lumMod val="75000"/>
+                    </a:schemeClr>
+                  </a:solidFill>
+                </a:rPr>
+                <a:t>Business Impact Simulation</a:t>
+              </a:r>
+            </a:p>
+          </p:txBody>
+        </p:sp>
+        <p:cxnSp>
+          <p:nvCxnSpPr>
+            <p:cNvPr id="13" name="Straight Connector 12">
+              <a:extLst>
+                <a:ext uri="{FF2B5EF4-FFF2-40B4-BE49-F238E27FC236}">
+                  <a16:creationId xmlns:a16="http://schemas.microsoft.com/office/drawing/2014/main" id="{3038E03D-4228-3C5C-8006-30AA7DAD649E}"/>
+                </a:ext>
+              </a:extLst>
+            </p:cNvPr>
+            <p:cNvCxnSpPr>
+              <a:cxnSpLocks/>
+            </p:cNvCxnSpPr>
+            <p:nvPr/>
+          </p:nvCxnSpPr>
+          <p:spPr>
+            <a:xfrm>
+              <a:off x="81280" y="538480"/>
+              <a:ext cx="12110720" cy="0"/>
+            </a:xfrm>
+            <a:prstGeom prst="line">
+              <a:avLst/>
+            </a:prstGeom>
+            <a:ln>
+              <a:solidFill>
+                <a:schemeClr val="tx2">
+                  <a:lumMod val="10000"/>
+                  <a:lumOff val="90000"/>
+                </a:schemeClr>
+              </a:solidFill>
+            </a:ln>
+          </p:spPr>
+          <p:style>
+            <a:lnRef idx="2">
+              <a:schemeClr val="accent1"/>
+            </a:lnRef>
+            <a:fillRef idx="0">
+              <a:schemeClr val="accent1"/>
+            </a:fillRef>
+            <a:effectRef idx="1">
+              <a:schemeClr val="accent1"/>
+            </a:effectRef>
+            <a:fontRef idx="minor">
+              <a:schemeClr val="tx1"/>
+            </a:fontRef>
+          </p:style>
+        </p:cxnSp>
+        <p:sp>
+          <p:nvSpPr>
+            <p:cNvPr id="15" name="Rectangle 14">
+              <a:extLst>
+                <a:ext uri="{FF2B5EF4-FFF2-40B4-BE49-F238E27FC236}">
+                  <a16:creationId xmlns:a16="http://schemas.microsoft.com/office/drawing/2014/main" id="{B8AC678F-603B-600F-1450-D5A2D4F723A0}"/>
+                </a:ext>
+              </a:extLst>
+            </p:cNvPr>
+            <p:cNvSpPr/>
+            <p:nvPr/>
+          </p:nvSpPr>
+          <p:spPr>
+            <a:xfrm>
+              <a:off x="0" y="0"/>
+              <a:ext cx="325120" cy="6858000"/>
+            </a:xfrm>
+            <a:prstGeom prst="rect">
+              <a:avLst/>
+            </a:prstGeom>
+            <a:gradFill flip="none" rotWithShape="1">
+              <a:gsLst>
+                <a:gs pos="0">
+                  <a:schemeClr val="accent1">
+                    <a:tint val="66000"/>
+                    <a:satMod val="160000"/>
+                  </a:schemeClr>
+                </a:gs>
+                <a:gs pos="50000">
+                  <a:schemeClr val="accent1">
+                    <a:tint val="44500"/>
+                    <a:satMod val="160000"/>
+                  </a:schemeClr>
+                </a:gs>
+                <a:gs pos="100000">
+                  <a:schemeClr val="accent1">
+                    <a:tint val="23500"/>
+                    <a:satMod val="160000"/>
+                  </a:schemeClr>
+                </a:gs>
+              </a:gsLst>
+              <a:lin ang="2700000" scaled="1"/>
+              <a:tileRect/>
+            </a:gradFill>
+            <a:ln>
+              <a:noFill/>
+            </a:ln>
+          </p:spPr>
+          <p:style>
+            <a:lnRef idx="2">
+              <a:schemeClr val="accent1">
+                <a:shade val="15000"/>
+              </a:schemeClr>
+            </a:lnRef>
+            <a:fillRef idx="1">
+              <a:schemeClr val="accent1"/>
+            </a:fillRef>
+            <a:effectRef idx="0">
+              <a:schemeClr val="accent1"/>
+            </a:effectRef>
+            <a:fontRef idx="minor">
+              <a:schemeClr val="lt1"/>
+            </a:fontRef>
+          </p:style>
+          <p:txBody>
+            <a:bodyPr rtlCol="0" anchor="ctr"/>
+            <a:lstStyle/>
+            <a:p>
+              <a:pPr algn="ctr"/>
+              <a:endParaRPr lang="en-US"/>
+            </a:p>
+          </p:txBody>
+        </p:sp>
+        <p:cxnSp>
+          <p:nvCxnSpPr>
+            <p:cNvPr id="17" name="Straight Connector 16">
+              <a:extLst>
+                <a:ext uri="{FF2B5EF4-FFF2-40B4-BE49-F238E27FC236}">
+                  <a16:creationId xmlns:a16="http://schemas.microsoft.com/office/drawing/2014/main" id="{A33804AC-5866-4DF9-47B7-BEF141661271}"/>
+                </a:ext>
+              </a:extLst>
+            </p:cNvPr>
+            <p:cNvCxnSpPr>
+              <a:cxnSpLocks/>
+            </p:cNvCxnSpPr>
+            <p:nvPr/>
+          </p:nvCxnSpPr>
+          <p:spPr>
+            <a:xfrm>
+              <a:off x="325120" y="523815"/>
+              <a:ext cx="11866880" cy="0"/>
+            </a:xfrm>
+            <a:prstGeom prst="line">
+              <a:avLst/>
+            </a:prstGeom>
+            <a:ln w="6350">
+              <a:solidFill>
+                <a:schemeClr val="accent1">
+                  <a:lumMod val="75000"/>
+                </a:schemeClr>
+              </a:solidFill>
+            </a:ln>
+          </p:spPr>
+          <p:style>
+            <a:lnRef idx="2">
+              <a:schemeClr val="accent1"/>
+            </a:lnRef>
+            <a:fillRef idx="0">
+              <a:schemeClr val="accent1"/>
+            </a:fillRef>
+            <a:effectRef idx="1">
+              <a:schemeClr val="accent1"/>
+            </a:effectRef>
+            <a:fontRef idx="minor">
+              <a:schemeClr val="tx1"/>
+            </a:fontRef>
+          </p:style>
+        </p:cxnSp>
+        <p:cxnSp>
+          <p:nvCxnSpPr>
+            <p:cNvPr id="19" name="Straight Connector 18">
+              <a:extLst>
+                <a:ext uri="{FF2B5EF4-FFF2-40B4-BE49-F238E27FC236}">
+                  <a16:creationId xmlns:a16="http://schemas.microsoft.com/office/drawing/2014/main" id="{420FBB41-202E-4C70-3E42-99EF5A91B894}"/>
+                </a:ext>
+              </a:extLst>
+            </p:cNvPr>
+            <p:cNvCxnSpPr>
+              <a:cxnSpLocks/>
+            </p:cNvCxnSpPr>
+            <p:nvPr/>
+          </p:nvCxnSpPr>
+          <p:spPr>
+            <a:xfrm>
+              <a:off x="325120" y="554295"/>
+              <a:ext cx="11866880" cy="0"/>
+            </a:xfrm>
+            <a:prstGeom prst="line">
+              <a:avLst/>
+            </a:prstGeom>
+            <a:ln w="6350">
+              <a:solidFill>
+                <a:schemeClr val="accent1">
+                  <a:lumMod val="75000"/>
+                </a:schemeClr>
+              </a:solidFill>
+            </a:ln>
+          </p:spPr>
+          <p:style>
+            <a:lnRef idx="2">
+              <a:schemeClr val="accent1"/>
+            </a:lnRef>
+            <a:fillRef idx="0">
+              <a:schemeClr val="accent1"/>
+            </a:fillRef>
+            <a:effectRef idx="1">
+              <a:schemeClr val="accent1"/>
+            </a:effectRef>
+            <a:fontRef idx="minor">
+              <a:schemeClr val="tx1"/>
+            </a:fontRef>
+          </p:style>
+        </p:cxnSp>
+      </p:grpSp>
+      <p:sp>
+        <p:nvSpPr>
+          <p:cNvPr id="4" name="TextBox 3">
+            <a:extLst>
+              <a:ext uri="{FF2B5EF4-FFF2-40B4-BE49-F238E27FC236}">
+                <a16:creationId xmlns:a16="http://schemas.microsoft.com/office/drawing/2014/main" id="{0C47ADA2-5ED5-2D2A-2167-A8F1B4BC4A8C}"/>
+              </a:ext>
+            </a:extLst>
+          </p:cNvPr>
+          <p:cNvSpPr txBox="1"/>
+          <p:nvPr/>
+        </p:nvSpPr>
+        <p:spPr>
+          <a:xfrm>
+            <a:off x="1328057" y="1683381"/>
+            <a:ext cx="8585200" cy="1477328"/>
+          </a:xfrm>
+          <a:prstGeom prst="rect">
+            <a:avLst/>
+          </a:prstGeom>
+          <a:noFill/>
+        </p:spPr>
+        <p:txBody>
+          <a:bodyPr wrap="square">
+            <a:spAutoFit/>
+          </a:bodyPr>
+          <a:lstStyle/>
+          <a:p>
+            <a:pPr>
+              <a:buNone/>
+            </a:pPr>
+            <a:r>
+              <a:rPr lang="en-US" b="1" dirty="0"/>
+              <a:t>Business Impact Simulation</a:t>
+            </a:r>
+          </a:p>
+          <a:p>
+            <a:pPr>
+              <a:buFont typeface="Arial" panose="020B0604020202020204" pitchFamily="34" charset="0"/>
+              <a:buChar char="•"/>
+            </a:pPr>
+            <a:r>
+              <a:rPr lang="en-US" dirty="0"/>
+              <a:t>Without model: acceptance of all applicants → higher defaults.</a:t>
+            </a:r>
+          </a:p>
+          <a:p>
+            <a:pPr>
+              <a:buFont typeface="Arial" panose="020B0604020202020204" pitchFamily="34" charset="0"/>
+              <a:buChar char="•"/>
+            </a:pPr>
+            <a:r>
+              <a:rPr lang="en-US" dirty="0"/>
+              <a:t>With model: reject X% of predicted high-risk borrowers → fewer defaults.</a:t>
+            </a:r>
+          </a:p>
+          <a:p>
+            <a:pPr>
+              <a:buFont typeface="Arial" panose="020B0604020202020204" pitchFamily="34" charset="0"/>
+              <a:buChar char="•"/>
+            </a:pPr>
+            <a:r>
+              <a:rPr lang="en-US" dirty="0"/>
+              <a:t>Estimated financial uplift (profit curve / cost-benefit table).</a:t>
+            </a:r>
+          </a:p>
+          <a:p>
+            <a:pPr>
+              <a:buFont typeface="Arial" panose="020B0604020202020204" pitchFamily="34" charset="0"/>
+              <a:buChar char="•"/>
+            </a:pPr>
+            <a:r>
+              <a:rPr lang="en-US" dirty="0"/>
+              <a:t>Assumptions stated clearly (e.g., interest rate = 12%, loss given default = 100%).</a:t>
+            </a:r>
+          </a:p>
+        </p:txBody>
+      </p:sp>
+    </p:spTree>
+    <p:extLst>
+      <p:ext uri="{BB962C8B-B14F-4D97-AF65-F5344CB8AC3E}">
+        <p14:creationId xmlns:p14="http://schemas.microsoft.com/office/powerpoint/2010/main" val="112157122"/>
+      </p:ext>
+    </p:extLst>
+  </p:cSld>
+  <p:clrMapOvr>
+    <a:masterClrMapping/>
+  </p:clrMapOvr>
+</p:sld>
+</file>
+
+<file path=ppt/slides/slide11.xml><?xml version="1.0" encoding="utf-8"?>
+<p:sld xmlns:a="http://schemas.openxmlformats.org/drawingml/2006/main" xmlns:r="http://schemas.openxmlformats.org/officeDocument/2006/relationships" xmlns:p="http://schemas.openxmlformats.org/presentationml/2006/main">
+  <p:cSld>
+    <p:spTree>
+      <p:nvGrpSpPr>
+        <p:cNvPr id="1" name="">
+          <a:extLst>
+            <a:ext uri="{FF2B5EF4-FFF2-40B4-BE49-F238E27FC236}">
               <a16:creationId xmlns:a16="http://schemas.microsoft.com/office/drawing/2014/main" id="{015409A6-D05D-AD64-7E4F-3C97C08FBF66}"/>
             </a:ext>
           </a:extLst>
@@ -5333,7 +5833,7 @@
 </p:sld>
 </file>
 
-<file path=ppt/slides/slide11.xml><?xml version="1.0" encoding="utf-8"?>
+<file path=ppt/slides/slide12.xml><?xml version="1.0" encoding="utf-8"?>
 <p:sld xmlns:a="http://schemas.openxmlformats.org/drawingml/2006/main" xmlns:r="http://schemas.openxmlformats.org/officeDocument/2006/relationships" xmlns:p="http://schemas.openxmlformats.org/presentationml/2006/main">
   <p:cSld>
     <p:spTree>
@@ -5640,7 +6140,7 @@
 </p:sld>
 </file>
 
-<file path=ppt/slides/slide12.xml><?xml version="1.0" encoding="utf-8"?>
+<file path=ppt/slides/slide13.xml><?xml version="1.0" encoding="utf-8"?>
 <p:sld xmlns:a="http://schemas.openxmlformats.org/drawingml/2006/main" xmlns:r="http://schemas.openxmlformats.org/officeDocument/2006/relationships" xmlns:p="http://schemas.openxmlformats.org/presentationml/2006/main">
   <p:cSld>
     <p:spTree>
@@ -5947,7 +6447,7 @@
 </p:sld>
 </file>
 
-<file path=ppt/slides/slide13.xml><?xml version="1.0" encoding="utf-8"?>
+<file path=ppt/slides/slide14.xml><?xml version="1.0" encoding="utf-8"?>
 <p:sld xmlns:a="http://schemas.openxmlformats.org/drawingml/2006/main" xmlns:r="http://schemas.openxmlformats.org/officeDocument/2006/relationships" xmlns:p="http://schemas.openxmlformats.org/presentationml/2006/main">
   <p:cSld>
     <p:spTree>
@@ -6337,7 +6837,7 @@
 </p:sld>
 </file>
 
-<file path=ppt/slides/slide14.xml><?xml version="1.0" encoding="utf-8"?>
+<file path=ppt/slides/slide15.xml><?xml version="1.0" encoding="utf-8"?>
 <p:sld xmlns:a="http://schemas.openxmlformats.org/drawingml/2006/main" xmlns:r="http://schemas.openxmlformats.org/officeDocument/2006/relationships" xmlns:p="http://schemas.openxmlformats.org/presentationml/2006/main">
   <p:cSld>
     <p:spTree>
@@ -6446,7 +6946,7 @@
 </p:sld>
 </file>
 
-<file path=ppt/slides/slide15.xml><?xml version="1.0" encoding="utf-8"?>
+<file path=ppt/slides/slide16.xml><?xml version="1.0" encoding="utf-8"?>
 <p:sld xmlns:a="http://schemas.openxmlformats.org/drawingml/2006/main" xmlns:r="http://schemas.openxmlformats.org/officeDocument/2006/relationships" xmlns:p="http://schemas.openxmlformats.org/presentationml/2006/main">
   <p:cSld>
     <p:spTree>
@@ -8127,7 +8627,7 @@
         </p:nvSpPr>
         <p:spPr>
           <a:xfrm>
-            <a:off x="1714610" y="2505670"/>
+            <a:off x="1016000" y="1305213"/>
             <a:ext cx="8348870" cy="1200329"/>
           </a:xfrm>
           <a:prstGeom prst="rect">
@@ -8208,8 +8708,8 @@
         </p:nvSpPr>
         <p:spPr bwMode="auto">
           <a:xfrm>
-            <a:off x="1016000" y="4934857"/>
-            <a:ext cx="12192000" cy="0"/>
+            <a:off x="1117600" y="2698391"/>
+            <a:ext cx="12293600" cy="1200329"/>
           </a:xfrm>
           <a:prstGeom prst="rect">
             <a:avLst/>
@@ -8249,7 +8749,7 @@
           </a:extLst>
         </p:spPr>
         <p:txBody>
-          <a:bodyPr vert="horz" wrap="none" lIns="91440" tIns="45720" rIns="91440" bIns="45720" numCol="1" anchor="ctr" anchorCtr="0" compatLnSpc="1">
+          <a:bodyPr vert="horz" wrap="square" lIns="91440" tIns="45720" rIns="91440" bIns="45720" numCol="1" anchor="ctr" anchorCtr="0" compatLnSpc="1">
             <a:prstTxWarp prst="textNoShape">
               <a:avLst/>
             </a:prstTxWarp>
@@ -8274,7 +8774,7 @@
               <a:tabLst/>
             </a:pPr>
             <a:r>
-              <a:rPr kumimoji="0" lang="en-US" altLang="en-US" sz="1800" b="0" i="0" u="none" strike="noStrike" cap="none" normalizeH="0" baseline="0">
+              <a:rPr kumimoji="0" lang="en-US" altLang="en-US" sz="1800" b="0" i="0" u="none" strike="noStrike" cap="none" normalizeH="0" baseline="0" dirty="0">
                 <a:ln>
                   <a:noFill/>
                 </a:ln>
@@ -8305,7 +8805,7 @@
               <a:tabLst/>
             </a:pPr>
             <a:r>
-              <a:rPr kumimoji="0" lang="en-US" altLang="en-US" sz="1800" b="0" i="0" u="none" strike="noStrike" cap="none" normalizeH="0" baseline="0">
+              <a:rPr kumimoji="0" lang="en-US" altLang="en-US" sz="1800" b="0" i="0" u="none" strike="noStrike" cap="none" normalizeH="0" baseline="0" dirty="0">
                 <a:ln>
                   <a:noFill/>
                 </a:ln>
@@ -8336,7 +8836,7 @@
               <a:tabLst/>
             </a:pPr>
             <a:r>
-              <a:rPr kumimoji="0" lang="en-US" altLang="en-US" sz="1800" b="0" i="0" u="none" strike="noStrike" cap="none" normalizeH="0" baseline="0">
+              <a:rPr kumimoji="0" lang="en-US" altLang="en-US" sz="1800" b="0" i="0" u="none" strike="noStrike" cap="none" normalizeH="0" baseline="0" dirty="0">
                 <a:ln>
                   <a:noFill/>
                 </a:ln>
@@ -8367,7 +8867,7 @@
               <a:tabLst/>
             </a:pPr>
             <a:r>
-              <a:rPr kumimoji="0" lang="en-US" altLang="en-US" sz="1800" b="0" i="0" u="none" strike="noStrike" cap="none" normalizeH="0" baseline="0">
+              <a:rPr kumimoji="0" lang="en-US" altLang="en-US" sz="1800" b="0" i="0" u="none" strike="noStrike" cap="none" normalizeH="0" baseline="0" dirty="0">
                 <a:ln>
                   <a:noFill/>
                 </a:ln>
@@ -8384,42 +8884,99 @@
       </p:sp>
       <p:sp>
         <p:nvSpPr>
-          <p:cNvPr id="6" name="TextBox 5">
-            <a:extLst>
-              <a:ext uri="{FF2B5EF4-FFF2-40B4-BE49-F238E27FC236}">
-                <a16:creationId xmlns:a16="http://schemas.microsoft.com/office/drawing/2014/main" id="{C2429CD9-17F1-637D-26F2-35787FE6DFC4}"/>
-              </a:ext>
-            </a:extLst>
-          </p:cNvPr>
-          <p:cNvSpPr txBox="1"/>
+          <p:cNvPr id="7" name="Rectangle 1">
+            <a:extLst>
+              <a:ext uri="{FF2B5EF4-FFF2-40B4-BE49-F238E27FC236}">
+                <a16:creationId xmlns:a16="http://schemas.microsoft.com/office/drawing/2014/main" id="{7DA11AEF-A2F0-B4DB-0C13-482825D11887}"/>
+              </a:ext>
+            </a:extLst>
+          </p:cNvPr>
+          <p:cNvSpPr>
+            <a:spLocks noChangeArrowheads="1"/>
+          </p:cNvSpPr>
           <p:nvPr/>
         </p:nvSpPr>
-        <p:spPr>
+        <p:spPr bwMode="auto">
           <a:xfrm>
-            <a:off x="1001486" y="6103224"/>
-            <a:ext cx="6110514" cy="369332"/>
+            <a:off x="645886" y="4680117"/>
+            <a:ext cx="12293600" cy="1200329"/>
           </a:xfrm>
           <a:prstGeom prst="rect">
             <a:avLst/>
           </a:prstGeom>
           <a:noFill/>
+          <a:ln>
+            <a:noFill/>
+          </a:ln>
+          <a:effectLst/>
+          <a:extLst>
+            <a:ext uri="{909E8E84-426E-40DD-AFC4-6F175D3DCCD1}">
+              <a14:hiddenFill xmlns:a14="http://schemas.microsoft.com/office/drawing/2010/main">
+                <a:solidFill>
+                  <a:schemeClr val="accent1"/>
+                </a:solidFill>
+              </a14:hiddenFill>
+            </a:ext>
+            <a:ext uri="{91240B29-F687-4F45-9708-019B960494DF}">
+              <a14:hiddenLine xmlns:a14="http://schemas.microsoft.com/office/drawing/2010/main" w="9525">
+                <a:solidFill>
+                  <a:schemeClr val="tx1"/>
+                </a:solidFill>
+                <a:miter lim="800000"/>
+                <a:headEnd/>
+                <a:tailEnd/>
+              </a14:hiddenLine>
+            </a:ext>
+            <a:ext uri="{AF507438-7753-43E0-B8FC-AC1667EBCBE1}">
+              <a14:hiddenEffects xmlns:a14="http://schemas.microsoft.com/office/drawing/2010/main">
+                <a:effectLst>
+                  <a:outerShdw dist="35921" dir="2700000" algn="ctr" rotWithShape="0">
+                    <a:schemeClr val="bg2"/>
+                  </a:outerShdw>
+                </a:effectLst>
+              </a14:hiddenEffects>
+            </a:ext>
+          </a:extLst>
         </p:spPr>
         <p:txBody>
-          <a:bodyPr wrap="square">
+          <a:bodyPr vert="horz" wrap="square" lIns="91440" tIns="45720" rIns="91440" bIns="45720" numCol="1" anchor="ctr" anchorCtr="0" compatLnSpc="1">
+            <a:prstTxWarp prst="textNoShape">
+              <a:avLst/>
+            </a:prstTxWarp>
             <a:spAutoFit/>
           </a:bodyPr>
           <a:lstStyle/>
           <a:p>
-            <a:r>
-              <a:rPr lang="en-US" sz="1800" b="1" dirty="0">
-                <a:solidFill>
-                  <a:schemeClr val="accent1">
-                    <a:lumMod val="75000"/>
-                  </a:schemeClr>
-                </a:solidFill>
+            <a:pPr marL="0" marR="0" lvl="0" indent="0" algn="l" defTabSz="914400" rtl="0" eaLnBrk="0" fontAlgn="base" latinLnBrk="0" hangingPunct="0">
+              <a:lnSpc>
+                <a:spcPct val="100000"/>
+              </a:lnSpc>
+              <a:spcBef>
+                <a:spcPct val="0"/>
+              </a:spcBef>
+              <a:spcAft>
+                <a:spcPct val="0"/>
+              </a:spcAft>
+              <a:buClrTx/>
+              <a:buSzTx/>
+              <a:tabLst/>
+            </a:pPr>
+            <a:r>
+              <a:rPr lang="en-US" altLang="en-US" sz="3600" dirty="0">
+                <a:latin typeface="Arial" panose="020B0604020202020204" pitchFamily="34" charset="0"/>
               </a:rPr>
-              <a:t>Data Wrangling</a:t>
-            </a:r>
+              <a:t>10,000 datapoints, 26 input features, 1 target variable – 87.05% good loans and 12.95% bad loans </a:t>
+            </a:r>
+            <a:endParaRPr kumimoji="0" lang="en-US" altLang="en-US" sz="3600" b="0" i="0" u="none" strike="noStrike" cap="none" normalizeH="0" baseline="0" dirty="0">
+              <a:ln>
+                <a:noFill/>
+              </a:ln>
+              <a:solidFill>
+                <a:schemeClr val="tx1"/>
+              </a:solidFill>
+              <a:effectLst/>
+              <a:latin typeface="Arial" panose="020B0604020202020204" pitchFamily="34" charset="0"/>
+            </a:endParaRPr>
           </a:p>
         </p:txBody>
       </p:sp>
@@ -8910,6 +9467,408 @@
         <p:cNvPr id="1" name="">
           <a:extLst>
             <a:ext uri="{FF2B5EF4-FFF2-40B4-BE49-F238E27FC236}">
+              <a16:creationId xmlns:a16="http://schemas.microsoft.com/office/drawing/2014/main" id="{93164F77-7F74-9694-323A-491248DCE1ED}"/>
+            </a:ext>
+          </a:extLst>
+        </p:cNvPr>
+        <p:cNvGrpSpPr/>
+        <p:nvPr/>
+      </p:nvGrpSpPr>
+      <p:grpSpPr>
+        <a:xfrm>
+          <a:off x="0" y="0"/>
+          <a:ext cx="0" cy="0"/>
+          <a:chOff x="0" y="0"/>
+          <a:chExt cx="0" cy="0"/>
+        </a:xfrm>
+      </p:grpSpPr>
+      <p:grpSp>
+        <p:nvGrpSpPr>
+          <p:cNvPr id="20" name="Group 19">
+            <a:extLst>
+              <a:ext uri="{FF2B5EF4-FFF2-40B4-BE49-F238E27FC236}">
+                <a16:creationId xmlns:a16="http://schemas.microsoft.com/office/drawing/2014/main" id="{76FEF58B-5645-B4C5-9346-DADB2A65E174}"/>
+              </a:ext>
+            </a:extLst>
+          </p:cNvPr>
+          <p:cNvGrpSpPr/>
+          <p:nvPr/>
+        </p:nvGrpSpPr>
+        <p:grpSpPr>
+          <a:xfrm>
+            <a:off x="0" y="0"/>
+            <a:ext cx="12192000" cy="6858000"/>
+            <a:chOff x="0" y="0"/>
+            <a:chExt cx="12192000" cy="6858000"/>
+          </a:xfrm>
+        </p:grpSpPr>
+        <p:sp>
+          <p:nvSpPr>
+            <p:cNvPr id="9" name="TextBox 8">
+              <a:extLst>
+                <a:ext uri="{FF2B5EF4-FFF2-40B4-BE49-F238E27FC236}">
+                  <a16:creationId xmlns:a16="http://schemas.microsoft.com/office/drawing/2014/main" id="{2AA51640-2B79-6A87-ED43-679DECA234DB}"/>
+                </a:ext>
+              </a:extLst>
+            </p:cNvPr>
+            <p:cNvSpPr txBox="1"/>
+            <p:nvPr/>
+          </p:nvSpPr>
+          <p:spPr>
+            <a:xfrm>
+              <a:off x="325120" y="0"/>
+              <a:ext cx="11866880" cy="584775"/>
+            </a:xfrm>
+            <a:prstGeom prst="rect">
+              <a:avLst/>
+            </a:prstGeom>
+            <a:noFill/>
+          </p:spPr>
+          <p:txBody>
+            <a:bodyPr wrap="square" rtlCol="0">
+              <a:spAutoFit/>
+            </a:bodyPr>
+            <a:lstStyle/>
+            <a:p>
+              <a:r>
+                <a:rPr lang="en-US" sz="3200" b="1" dirty="0">
+                  <a:solidFill>
+                    <a:schemeClr val="accent1">
+                      <a:lumMod val="75000"/>
+                    </a:schemeClr>
+                  </a:solidFill>
+                </a:rPr>
+                <a:t>Dataset refinement</a:t>
+              </a:r>
+            </a:p>
+          </p:txBody>
+        </p:sp>
+        <p:cxnSp>
+          <p:nvCxnSpPr>
+            <p:cNvPr id="13" name="Straight Connector 12">
+              <a:extLst>
+                <a:ext uri="{FF2B5EF4-FFF2-40B4-BE49-F238E27FC236}">
+                  <a16:creationId xmlns:a16="http://schemas.microsoft.com/office/drawing/2014/main" id="{0FFD7C33-CDA3-EACD-8E85-F9505302B6FA}"/>
+                </a:ext>
+              </a:extLst>
+            </p:cNvPr>
+            <p:cNvCxnSpPr>
+              <a:cxnSpLocks/>
+            </p:cNvCxnSpPr>
+            <p:nvPr/>
+          </p:nvCxnSpPr>
+          <p:spPr>
+            <a:xfrm>
+              <a:off x="81280" y="538480"/>
+              <a:ext cx="12110720" cy="0"/>
+            </a:xfrm>
+            <a:prstGeom prst="line">
+              <a:avLst/>
+            </a:prstGeom>
+            <a:ln>
+              <a:solidFill>
+                <a:schemeClr val="tx2">
+                  <a:lumMod val="10000"/>
+                  <a:lumOff val="90000"/>
+                </a:schemeClr>
+              </a:solidFill>
+            </a:ln>
+          </p:spPr>
+          <p:style>
+            <a:lnRef idx="2">
+              <a:schemeClr val="accent1"/>
+            </a:lnRef>
+            <a:fillRef idx="0">
+              <a:schemeClr val="accent1"/>
+            </a:fillRef>
+            <a:effectRef idx="1">
+              <a:schemeClr val="accent1"/>
+            </a:effectRef>
+            <a:fontRef idx="minor">
+              <a:schemeClr val="tx1"/>
+            </a:fontRef>
+          </p:style>
+        </p:cxnSp>
+        <p:sp>
+          <p:nvSpPr>
+            <p:cNvPr id="15" name="Rectangle 14">
+              <a:extLst>
+                <a:ext uri="{FF2B5EF4-FFF2-40B4-BE49-F238E27FC236}">
+                  <a16:creationId xmlns:a16="http://schemas.microsoft.com/office/drawing/2014/main" id="{60AD93C1-9C0F-FC2D-3929-B09CAB64FDA7}"/>
+                </a:ext>
+              </a:extLst>
+            </p:cNvPr>
+            <p:cNvSpPr/>
+            <p:nvPr/>
+          </p:nvSpPr>
+          <p:spPr>
+            <a:xfrm>
+              <a:off x="0" y="0"/>
+              <a:ext cx="325120" cy="6858000"/>
+            </a:xfrm>
+            <a:prstGeom prst="rect">
+              <a:avLst/>
+            </a:prstGeom>
+            <a:gradFill flip="none" rotWithShape="1">
+              <a:gsLst>
+                <a:gs pos="0">
+                  <a:schemeClr val="accent1">
+                    <a:tint val="66000"/>
+                    <a:satMod val="160000"/>
+                  </a:schemeClr>
+                </a:gs>
+                <a:gs pos="50000">
+                  <a:schemeClr val="accent1">
+                    <a:tint val="44500"/>
+                    <a:satMod val="160000"/>
+                  </a:schemeClr>
+                </a:gs>
+                <a:gs pos="100000">
+                  <a:schemeClr val="accent1">
+                    <a:tint val="23500"/>
+                    <a:satMod val="160000"/>
+                  </a:schemeClr>
+                </a:gs>
+              </a:gsLst>
+              <a:lin ang="2700000" scaled="1"/>
+              <a:tileRect/>
+            </a:gradFill>
+            <a:ln>
+              <a:noFill/>
+            </a:ln>
+          </p:spPr>
+          <p:style>
+            <a:lnRef idx="2">
+              <a:schemeClr val="accent1">
+                <a:shade val="15000"/>
+              </a:schemeClr>
+            </a:lnRef>
+            <a:fillRef idx="1">
+              <a:schemeClr val="accent1"/>
+            </a:fillRef>
+            <a:effectRef idx="0">
+              <a:schemeClr val="accent1"/>
+            </a:effectRef>
+            <a:fontRef idx="minor">
+              <a:schemeClr val="lt1"/>
+            </a:fontRef>
+          </p:style>
+          <p:txBody>
+            <a:bodyPr rtlCol="0" anchor="ctr"/>
+            <a:lstStyle/>
+            <a:p>
+              <a:pPr algn="ctr"/>
+              <a:endParaRPr lang="en-US"/>
+            </a:p>
+          </p:txBody>
+        </p:sp>
+        <p:cxnSp>
+          <p:nvCxnSpPr>
+            <p:cNvPr id="17" name="Straight Connector 16">
+              <a:extLst>
+                <a:ext uri="{FF2B5EF4-FFF2-40B4-BE49-F238E27FC236}">
+                  <a16:creationId xmlns:a16="http://schemas.microsoft.com/office/drawing/2014/main" id="{E4C8A887-FE86-A8BF-99AC-15B0B5B8C956}"/>
+                </a:ext>
+              </a:extLst>
+            </p:cNvPr>
+            <p:cNvCxnSpPr>
+              <a:cxnSpLocks/>
+            </p:cNvCxnSpPr>
+            <p:nvPr/>
+          </p:nvCxnSpPr>
+          <p:spPr>
+            <a:xfrm>
+              <a:off x="325120" y="523815"/>
+              <a:ext cx="11866880" cy="0"/>
+            </a:xfrm>
+            <a:prstGeom prst="line">
+              <a:avLst/>
+            </a:prstGeom>
+            <a:ln w="6350">
+              <a:solidFill>
+                <a:schemeClr val="accent1">
+                  <a:lumMod val="75000"/>
+                </a:schemeClr>
+              </a:solidFill>
+            </a:ln>
+          </p:spPr>
+          <p:style>
+            <a:lnRef idx="2">
+              <a:schemeClr val="accent1"/>
+            </a:lnRef>
+            <a:fillRef idx="0">
+              <a:schemeClr val="accent1"/>
+            </a:fillRef>
+            <a:effectRef idx="1">
+              <a:schemeClr val="accent1"/>
+            </a:effectRef>
+            <a:fontRef idx="minor">
+              <a:schemeClr val="tx1"/>
+            </a:fontRef>
+          </p:style>
+        </p:cxnSp>
+        <p:cxnSp>
+          <p:nvCxnSpPr>
+            <p:cNvPr id="19" name="Straight Connector 18">
+              <a:extLst>
+                <a:ext uri="{FF2B5EF4-FFF2-40B4-BE49-F238E27FC236}">
+                  <a16:creationId xmlns:a16="http://schemas.microsoft.com/office/drawing/2014/main" id="{CEFCF009-ECE5-58EB-9BFC-1499A4A9A174}"/>
+                </a:ext>
+              </a:extLst>
+            </p:cNvPr>
+            <p:cNvCxnSpPr>
+              <a:cxnSpLocks/>
+            </p:cNvCxnSpPr>
+            <p:nvPr/>
+          </p:nvCxnSpPr>
+          <p:spPr>
+            <a:xfrm>
+              <a:off x="325120" y="554295"/>
+              <a:ext cx="11866880" cy="0"/>
+            </a:xfrm>
+            <a:prstGeom prst="line">
+              <a:avLst/>
+            </a:prstGeom>
+            <a:ln w="6350">
+              <a:solidFill>
+                <a:schemeClr val="accent1">
+                  <a:lumMod val="75000"/>
+                </a:schemeClr>
+              </a:solidFill>
+            </a:ln>
+          </p:spPr>
+          <p:style>
+            <a:lnRef idx="2">
+              <a:schemeClr val="accent1"/>
+            </a:lnRef>
+            <a:fillRef idx="0">
+              <a:schemeClr val="accent1"/>
+            </a:fillRef>
+            <a:effectRef idx="1">
+              <a:schemeClr val="accent1"/>
+            </a:effectRef>
+            <a:fontRef idx="minor">
+              <a:schemeClr val="tx1"/>
+            </a:fontRef>
+          </p:style>
+        </p:cxnSp>
+      </p:grpSp>
+      <p:sp>
+        <p:nvSpPr>
+          <p:cNvPr id="5" name="Rectangle 1">
+            <a:extLst>
+              <a:ext uri="{FF2B5EF4-FFF2-40B4-BE49-F238E27FC236}">
+                <a16:creationId xmlns:a16="http://schemas.microsoft.com/office/drawing/2014/main" id="{E1FDB582-13FF-03F8-7003-07A1E671162B}"/>
+              </a:ext>
+            </a:extLst>
+          </p:cNvPr>
+          <p:cNvSpPr>
+            <a:spLocks noChangeArrowheads="1"/>
+          </p:cNvSpPr>
+          <p:nvPr/>
+        </p:nvSpPr>
+        <p:spPr bwMode="auto">
+          <a:xfrm>
+            <a:off x="426720" y="1136134"/>
+            <a:ext cx="2274982" cy="369332"/>
+          </a:xfrm>
+          <a:prstGeom prst="rect">
+            <a:avLst/>
+          </a:prstGeom>
+          <a:noFill/>
+          <a:ln>
+            <a:noFill/>
+          </a:ln>
+          <a:effectLst/>
+          <a:extLst>
+            <a:ext uri="{909E8E84-426E-40DD-AFC4-6F175D3DCCD1}">
+              <a14:hiddenFill xmlns:a14="http://schemas.microsoft.com/office/drawing/2010/main">
+                <a:solidFill>
+                  <a:schemeClr val="accent1"/>
+                </a:solidFill>
+              </a14:hiddenFill>
+            </a:ext>
+            <a:ext uri="{91240B29-F687-4F45-9708-019B960494DF}">
+              <a14:hiddenLine xmlns:a14="http://schemas.microsoft.com/office/drawing/2010/main" w="9525">
+                <a:solidFill>
+                  <a:schemeClr val="tx1"/>
+                </a:solidFill>
+                <a:miter lim="800000"/>
+                <a:headEnd/>
+                <a:tailEnd/>
+              </a14:hiddenLine>
+            </a:ext>
+            <a:ext uri="{AF507438-7753-43E0-B8FC-AC1667EBCBE1}">
+              <a14:hiddenEffects xmlns:a14="http://schemas.microsoft.com/office/drawing/2010/main">
+                <a:effectLst>
+                  <a:outerShdw dist="35921" dir="2700000" algn="ctr" rotWithShape="0">
+                    <a:schemeClr val="bg2"/>
+                  </a:outerShdw>
+                </a:effectLst>
+              </a14:hiddenEffects>
+            </a:ext>
+          </a:extLst>
+        </p:spPr>
+        <p:txBody>
+          <a:bodyPr vert="horz" wrap="none" lIns="91440" tIns="45720" rIns="91440" bIns="45720" numCol="1" anchor="ctr" anchorCtr="0" compatLnSpc="1">
+            <a:prstTxWarp prst="textNoShape">
+              <a:avLst/>
+            </a:prstTxWarp>
+            <a:spAutoFit/>
+          </a:bodyPr>
+          <a:lstStyle/>
+          <a:p>
+            <a:pPr marL="0" marR="0" lvl="0" indent="0" algn="l" defTabSz="914400" rtl="0" eaLnBrk="0" fontAlgn="base" latinLnBrk="0" hangingPunct="0">
+              <a:lnSpc>
+                <a:spcPct val="100000"/>
+              </a:lnSpc>
+              <a:spcBef>
+                <a:spcPct val="0"/>
+              </a:spcBef>
+              <a:spcAft>
+                <a:spcPct val="0"/>
+              </a:spcAft>
+              <a:buClrTx/>
+              <a:buSzTx/>
+              <a:tabLst/>
+            </a:pPr>
+            <a:r>
+              <a:rPr kumimoji="0" lang="en-US" altLang="en-US" sz="1800" b="0" i="0" u="none" strike="noStrike" cap="none" normalizeH="0" baseline="0" dirty="0">
+                <a:ln>
+                  <a:noFill/>
+                </a:ln>
+                <a:solidFill>
+                  <a:schemeClr val="tx1"/>
+                </a:solidFill>
+                <a:effectLst/>
+                <a:latin typeface="Arial" panose="020B0604020202020204" pitchFamily="34" charset="0"/>
+              </a:rPr>
+              <a:t>3 columns dropped .</a:t>
+            </a:r>
+          </a:p>
+        </p:txBody>
+      </p:sp>
+    </p:spTree>
+    <p:extLst>
+      <p:ext uri="{BB962C8B-B14F-4D97-AF65-F5344CB8AC3E}">
+        <p14:creationId xmlns:p14="http://schemas.microsoft.com/office/powerpoint/2010/main" val="3594072781"/>
+      </p:ext>
+    </p:extLst>
+  </p:cSld>
+  <p:clrMapOvr>
+    <a:masterClrMapping/>
+  </p:clrMapOvr>
+</p:sld>
+</file>
+
+<file path=ppt/slides/slide7.xml><?xml version="1.0" encoding="utf-8"?>
+<p:sld xmlns:a="http://schemas.openxmlformats.org/drawingml/2006/main" xmlns:r="http://schemas.openxmlformats.org/officeDocument/2006/relationships" xmlns:p="http://schemas.openxmlformats.org/presentationml/2006/main">
+  <p:cSld>
+    <p:spTree>
+      <p:nvGrpSpPr>
+        <p:cNvPr id="1" name="">
+          <a:extLst>
+            <a:ext uri="{FF2B5EF4-FFF2-40B4-BE49-F238E27FC236}">
               <a16:creationId xmlns:a16="http://schemas.microsoft.com/office/drawing/2014/main" id="{7CA886E5-5805-E9B2-5BCA-E6EF06A6915B}"/>
             </a:ext>
           </a:extLst>
@@ -9308,7 +10267,7 @@
 </p:sld>
 </file>
 
-<file path=ppt/slides/slide7.xml><?xml version="1.0" encoding="utf-8"?>
+<file path=ppt/slides/slide8.xml><?xml version="1.0" encoding="utf-8"?>
 <p:sld xmlns:a="http://schemas.openxmlformats.org/drawingml/2006/main" xmlns:r="http://schemas.openxmlformats.org/officeDocument/2006/relationships" xmlns:p="http://schemas.openxmlformats.org/presentationml/2006/main">
   <p:cSld>
     <p:spTree>
@@ -9615,7 +10574,7 @@
 </p:sld>
 </file>
 
-<file path=ppt/slides/slide8.xml><?xml version="1.0" encoding="utf-8"?>
+<file path=ppt/slides/slide9.xml><?xml version="1.0" encoding="utf-8"?>
 <p:sld xmlns:a="http://schemas.openxmlformats.org/drawingml/2006/main" xmlns:r="http://schemas.openxmlformats.org/officeDocument/2006/relationships" xmlns:p="http://schemas.openxmlformats.org/presentationml/2006/main">
   <p:cSld>
     <p:spTree>
@@ -10072,391 +11031,6 @@
     <p:extLst>
       <p:ext uri="{BB962C8B-B14F-4D97-AF65-F5344CB8AC3E}">
         <p14:creationId xmlns:p14="http://schemas.microsoft.com/office/powerpoint/2010/main" val="2323787026"/>
-      </p:ext>
-    </p:extLst>
-  </p:cSld>
-  <p:clrMapOvr>
-    <a:masterClrMapping/>
-  </p:clrMapOvr>
-</p:sld>
-</file>
-
-<file path=ppt/slides/slide9.xml><?xml version="1.0" encoding="utf-8"?>
-<p:sld xmlns:a="http://schemas.openxmlformats.org/drawingml/2006/main" xmlns:r="http://schemas.openxmlformats.org/officeDocument/2006/relationships" xmlns:p="http://schemas.openxmlformats.org/presentationml/2006/main">
-  <p:cSld>
-    <p:spTree>
-      <p:nvGrpSpPr>
-        <p:cNvPr id="1" name="">
-          <a:extLst>
-            <a:ext uri="{FF2B5EF4-FFF2-40B4-BE49-F238E27FC236}">
-              <a16:creationId xmlns:a16="http://schemas.microsoft.com/office/drawing/2014/main" id="{6D488F88-CFE0-0044-2478-878EBB98BE79}"/>
-            </a:ext>
-          </a:extLst>
-        </p:cNvPr>
-        <p:cNvGrpSpPr/>
-        <p:nvPr/>
-      </p:nvGrpSpPr>
-      <p:grpSpPr>
-        <a:xfrm>
-          <a:off x="0" y="0"/>
-          <a:ext cx="0" cy="0"/>
-          <a:chOff x="0" y="0"/>
-          <a:chExt cx="0" cy="0"/>
-        </a:xfrm>
-      </p:grpSpPr>
-      <p:grpSp>
-        <p:nvGrpSpPr>
-          <p:cNvPr id="20" name="Group 19">
-            <a:extLst>
-              <a:ext uri="{FF2B5EF4-FFF2-40B4-BE49-F238E27FC236}">
-                <a16:creationId xmlns:a16="http://schemas.microsoft.com/office/drawing/2014/main" id="{97052BDD-91EA-6972-4BD8-744EF8494C7F}"/>
-              </a:ext>
-            </a:extLst>
-          </p:cNvPr>
-          <p:cNvGrpSpPr/>
-          <p:nvPr/>
-        </p:nvGrpSpPr>
-        <p:grpSpPr>
-          <a:xfrm>
-            <a:off x="0" y="0"/>
-            <a:ext cx="12192000" cy="6858000"/>
-            <a:chOff x="0" y="0"/>
-            <a:chExt cx="12192000" cy="6858000"/>
-          </a:xfrm>
-        </p:grpSpPr>
-        <p:sp>
-          <p:nvSpPr>
-            <p:cNvPr id="9" name="TextBox 8">
-              <a:extLst>
-                <a:ext uri="{FF2B5EF4-FFF2-40B4-BE49-F238E27FC236}">
-                  <a16:creationId xmlns:a16="http://schemas.microsoft.com/office/drawing/2014/main" id="{9EE4729A-4522-4DB7-C39B-31D58F716EB9}"/>
-                </a:ext>
-              </a:extLst>
-            </p:cNvPr>
-            <p:cNvSpPr txBox="1"/>
-            <p:nvPr/>
-          </p:nvSpPr>
-          <p:spPr>
-            <a:xfrm>
-              <a:off x="325120" y="0"/>
-              <a:ext cx="11866880" cy="584775"/>
-            </a:xfrm>
-            <a:prstGeom prst="rect">
-              <a:avLst/>
-            </a:prstGeom>
-            <a:noFill/>
-          </p:spPr>
-          <p:txBody>
-            <a:bodyPr wrap="square" rtlCol="0">
-              <a:spAutoFit/>
-            </a:bodyPr>
-            <a:lstStyle/>
-            <a:p>
-              <a:r>
-                <a:rPr lang="en-US" sz="3200" b="1" dirty="0">
-                  <a:solidFill>
-                    <a:schemeClr val="accent1">
-                      <a:lumMod val="75000"/>
-                    </a:schemeClr>
-                  </a:solidFill>
-                </a:rPr>
-                <a:t>Business Impact Simulation</a:t>
-              </a:r>
-            </a:p>
-          </p:txBody>
-        </p:sp>
-        <p:cxnSp>
-          <p:nvCxnSpPr>
-            <p:cNvPr id="13" name="Straight Connector 12">
-              <a:extLst>
-                <a:ext uri="{FF2B5EF4-FFF2-40B4-BE49-F238E27FC236}">
-                  <a16:creationId xmlns:a16="http://schemas.microsoft.com/office/drawing/2014/main" id="{3038E03D-4228-3C5C-8006-30AA7DAD649E}"/>
-                </a:ext>
-              </a:extLst>
-            </p:cNvPr>
-            <p:cNvCxnSpPr>
-              <a:cxnSpLocks/>
-            </p:cNvCxnSpPr>
-            <p:nvPr/>
-          </p:nvCxnSpPr>
-          <p:spPr>
-            <a:xfrm>
-              <a:off x="81280" y="538480"/>
-              <a:ext cx="12110720" cy="0"/>
-            </a:xfrm>
-            <a:prstGeom prst="line">
-              <a:avLst/>
-            </a:prstGeom>
-            <a:ln>
-              <a:solidFill>
-                <a:schemeClr val="tx2">
-                  <a:lumMod val="10000"/>
-                  <a:lumOff val="90000"/>
-                </a:schemeClr>
-              </a:solidFill>
-            </a:ln>
-          </p:spPr>
-          <p:style>
-            <a:lnRef idx="2">
-              <a:schemeClr val="accent1"/>
-            </a:lnRef>
-            <a:fillRef idx="0">
-              <a:schemeClr val="accent1"/>
-            </a:fillRef>
-            <a:effectRef idx="1">
-              <a:schemeClr val="accent1"/>
-            </a:effectRef>
-            <a:fontRef idx="minor">
-              <a:schemeClr val="tx1"/>
-            </a:fontRef>
-          </p:style>
-        </p:cxnSp>
-        <p:sp>
-          <p:nvSpPr>
-            <p:cNvPr id="15" name="Rectangle 14">
-              <a:extLst>
-                <a:ext uri="{FF2B5EF4-FFF2-40B4-BE49-F238E27FC236}">
-                  <a16:creationId xmlns:a16="http://schemas.microsoft.com/office/drawing/2014/main" id="{B8AC678F-603B-600F-1450-D5A2D4F723A0}"/>
-                </a:ext>
-              </a:extLst>
-            </p:cNvPr>
-            <p:cNvSpPr/>
-            <p:nvPr/>
-          </p:nvSpPr>
-          <p:spPr>
-            <a:xfrm>
-              <a:off x="0" y="0"/>
-              <a:ext cx="325120" cy="6858000"/>
-            </a:xfrm>
-            <a:prstGeom prst="rect">
-              <a:avLst/>
-            </a:prstGeom>
-            <a:gradFill flip="none" rotWithShape="1">
-              <a:gsLst>
-                <a:gs pos="0">
-                  <a:schemeClr val="accent1">
-                    <a:tint val="66000"/>
-                    <a:satMod val="160000"/>
-                  </a:schemeClr>
-                </a:gs>
-                <a:gs pos="50000">
-                  <a:schemeClr val="accent1">
-                    <a:tint val="44500"/>
-                    <a:satMod val="160000"/>
-                  </a:schemeClr>
-                </a:gs>
-                <a:gs pos="100000">
-                  <a:schemeClr val="accent1">
-                    <a:tint val="23500"/>
-                    <a:satMod val="160000"/>
-                  </a:schemeClr>
-                </a:gs>
-              </a:gsLst>
-              <a:lin ang="2700000" scaled="1"/>
-              <a:tileRect/>
-            </a:gradFill>
-            <a:ln>
-              <a:noFill/>
-            </a:ln>
-          </p:spPr>
-          <p:style>
-            <a:lnRef idx="2">
-              <a:schemeClr val="accent1">
-                <a:shade val="15000"/>
-              </a:schemeClr>
-            </a:lnRef>
-            <a:fillRef idx="1">
-              <a:schemeClr val="accent1"/>
-            </a:fillRef>
-            <a:effectRef idx="0">
-              <a:schemeClr val="accent1"/>
-            </a:effectRef>
-            <a:fontRef idx="minor">
-              <a:schemeClr val="lt1"/>
-            </a:fontRef>
-          </p:style>
-          <p:txBody>
-            <a:bodyPr rtlCol="0" anchor="ctr"/>
-            <a:lstStyle/>
-            <a:p>
-              <a:pPr algn="ctr"/>
-              <a:endParaRPr lang="en-US"/>
-            </a:p>
-          </p:txBody>
-        </p:sp>
-        <p:cxnSp>
-          <p:nvCxnSpPr>
-            <p:cNvPr id="17" name="Straight Connector 16">
-              <a:extLst>
-                <a:ext uri="{FF2B5EF4-FFF2-40B4-BE49-F238E27FC236}">
-                  <a16:creationId xmlns:a16="http://schemas.microsoft.com/office/drawing/2014/main" id="{A33804AC-5866-4DF9-47B7-BEF141661271}"/>
-                </a:ext>
-              </a:extLst>
-            </p:cNvPr>
-            <p:cNvCxnSpPr>
-              <a:cxnSpLocks/>
-            </p:cNvCxnSpPr>
-            <p:nvPr/>
-          </p:nvCxnSpPr>
-          <p:spPr>
-            <a:xfrm>
-              <a:off x="325120" y="523815"/>
-              <a:ext cx="11866880" cy="0"/>
-            </a:xfrm>
-            <a:prstGeom prst="line">
-              <a:avLst/>
-            </a:prstGeom>
-            <a:ln w="6350">
-              <a:solidFill>
-                <a:schemeClr val="accent1">
-                  <a:lumMod val="75000"/>
-                </a:schemeClr>
-              </a:solidFill>
-            </a:ln>
-          </p:spPr>
-          <p:style>
-            <a:lnRef idx="2">
-              <a:schemeClr val="accent1"/>
-            </a:lnRef>
-            <a:fillRef idx="0">
-              <a:schemeClr val="accent1"/>
-            </a:fillRef>
-            <a:effectRef idx="1">
-              <a:schemeClr val="accent1"/>
-            </a:effectRef>
-            <a:fontRef idx="minor">
-              <a:schemeClr val="tx1"/>
-            </a:fontRef>
-          </p:style>
-        </p:cxnSp>
-        <p:cxnSp>
-          <p:nvCxnSpPr>
-            <p:cNvPr id="19" name="Straight Connector 18">
-              <a:extLst>
-                <a:ext uri="{FF2B5EF4-FFF2-40B4-BE49-F238E27FC236}">
-                  <a16:creationId xmlns:a16="http://schemas.microsoft.com/office/drawing/2014/main" id="{420FBB41-202E-4C70-3E42-99EF5A91B894}"/>
-                </a:ext>
-              </a:extLst>
-            </p:cNvPr>
-            <p:cNvCxnSpPr>
-              <a:cxnSpLocks/>
-            </p:cNvCxnSpPr>
-            <p:nvPr/>
-          </p:nvCxnSpPr>
-          <p:spPr>
-            <a:xfrm>
-              <a:off x="325120" y="554295"/>
-              <a:ext cx="11866880" cy="0"/>
-            </a:xfrm>
-            <a:prstGeom prst="line">
-              <a:avLst/>
-            </a:prstGeom>
-            <a:ln w="6350">
-              <a:solidFill>
-                <a:schemeClr val="accent1">
-                  <a:lumMod val="75000"/>
-                </a:schemeClr>
-              </a:solidFill>
-            </a:ln>
-          </p:spPr>
-          <p:style>
-            <a:lnRef idx="2">
-              <a:schemeClr val="accent1"/>
-            </a:lnRef>
-            <a:fillRef idx="0">
-              <a:schemeClr val="accent1"/>
-            </a:fillRef>
-            <a:effectRef idx="1">
-              <a:schemeClr val="accent1"/>
-            </a:effectRef>
-            <a:fontRef idx="minor">
-              <a:schemeClr val="tx1"/>
-            </a:fontRef>
-          </p:style>
-        </p:cxnSp>
-      </p:grpSp>
-      <p:sp>
-        <p:nvSpPr>
-          <p:cNvPr id="4" name="TextBox 3">
-            <a:extLst>
-              <a:ext uri="{FF2B5EF4-FFF2-40B4-BE49-F238E27FC236}">
-                <a16:creationId xmlns:a16="http://schemas.microsoft.com/office/drawing/2014/main" id="{0C47ADA2-5ED5-2D2A-2167-A8F1B4BC4A8C}"/>
-              </a:ext>
-            </a:extLst>
-          </p:cNvPr>
-          <p:cNvSpPr txBox="1"/>
-          <p:nvPr/>
-        </p:nvSpPr>
-        <p:spPr>
-          <a:xfrm>
-            <a:off x="1328057" y="1683381"/>
-            <a:ext cx="8585200" cy="1477328"/>
-          </a:xfrm>
-          <a:prstGeom prst="rect">
-            <a:avLst/>
-          </a:prstGeom>
-          <a:noFill/>
-        </p:spPr>
-        <p:txBody>
-          <a:bodyPr wrap="square">
-            <a:spAutoFit/>
-          </a:bodyPr>
-          <a:lstStyle/>
-          <a:p>
-            <a:pPr>
-              <a:buNone/>
-            </a:pPr>
-            <a:r>
-              <a:rPr lang="en-US" b="1" dirty="0"/>
-              <a:t>Business Impact Simulation</a:t>
-            </a:r>
-          </a:p>
-          <a:p>
-            <a:pPr>
-              <a:buFont typeface="Arial" panose="020B0604020202020204" pitchFamily="34" charset="0"/>
-              <a:buChar char="•"/>
-            </a:pPr>
-            <a:r>
-              <a:rPr lang="en-US" dirty="0"/>
-              <a:t>Without model: acceptance of all applicants → higher defaults.</a:t>
-            </a:r>
-          </a:p>
-          <a:p>
-            <a:pPr>
-              <a:buFont typeface="Arial" panose="020B0604020202020204" pitchFamily="34" charset="0"/>
-              <a:buChar char="•"/>
-            </a:pPr>
-            <a:r>
-              <a:rPr lang="en-US" dirty="0"/>
-              <a:t>With model: reject X% of predicted high-risk borrowers → fewer defaults.</a:t>
-            </a:r>
-          </a:p>
-          <a:p>
-            <a:pPr>
-              <a:buFont typeface="Arial" panose="020B0604020202020204" pitchFamily="34" charset="0"/>
-              <a:buChar char="•"/>
-            </a:pPr>
-            <a:r>
-              <a:rPr lang="en-US" dirty="0"/>
-              <a:t>Estimated financial uplift (profit curve / cost-benefit table).</a:t>
-            </a:r>
-          </a:p>
-          <a:p>
-            <a:pPr>
-              <a:buFont typeface="Arial" panose="020B0604020202020204" pitchFamily="34" charset="0"/>
-              <a:buChar char="•"/>
-            </a:pPr>
-            <a:r>
-              <a:rPr lang="en-US" dirty="0"/>
-              <a:t>Assumptions stated clearly (e.g., interest rate = 12%, loss given default = 100%).</a:t>
-            </a:r>
-          </a:p>
-        </p:txBody>
-      </p:sp>
-    </p:spTree>
-    <p:extLst>
-      <p:ext uri="{BB962C8B-B14F-4D97-AF65-F5344CB8AC3E}">
-        <p14:creationId xmlns:p14="http://schemas.microsoft.com/office/powerpoint/2010/main" val="112157122"/>
       </p:ext>
     </p:extLst>
   </p:cSld>

</xml_diff>